<commit_message>
continued posted, update EDA
</commit_message>
<xml_diff>
--- a/ML_Poster.pptx
+++ b/ML_Poster.pptx
@@ -254,7 +254,7 @@
           <a:p>
             <a:fld id="{AFD5325B-1A15-4464-AC58-4D5851FBB6B7}" type="datetimeFigureOut">
               <a:rPr lang="en-CH" smtClean="0"/>
-              <a:t>11/19/2021</a:t>
+              <a:t>11/20/2021</a:t>
             </a:fld>
             <a:endParaRPr lang="en-CH"/>
           </a:p>
@@ -424,7 +424,7 @@
           <a:p>
             <a:fld id="{AFD5325B-1A15-4464-AC58-4D5851FBB6B7}" type="datetimeFigureOut">
               <a:rPr lang="en-CH" smtClean="0"/>
-              <a:t>11/19/2021</a:t>
+              <a:t>11/20/2021</a:t>
             </a:fld>
             <a:endParaRPr lang="en-CH"/>
           </a:p>
@@ -604,7 +604,7 @@
           <a:p>
             <a:fld id="{AFD5325B-1A15-4464-AC58-4D5851FBB6B7}" type="datetimeFigureOut">
               <a:rPr lang="en-CH" smtClean="0"/>
-              <a:t>11/19/2021</a:t>
+              <a:t>11/20/2021</a:t>
             </a:fld>
             <a:endParaRPr lang="en-CH"/>
           </a:p>
@@ -699,7 +699,7 @@
           <a:p>
             <a:fld id="{AFD5325B-1A15-4464-AC58-4D5851FBB6B7}" type="datetimeFigureOut">
               <a:rPr lang="en-CH" smtClean="0"/>
-              <a:t>11/19/2021</a:t>
+              <a:t>11/20/2021</a:t>
             </a:fld>
             <a:endParaRPr lang="en-CH"/>
           </a:p>
@@ -869,7 +869,7 @@
           <a:p>
             <a:fld id="{AFD5325B-1A15-4464-AC58-4D5851FBB6B7}" type="datetimeFigureOut">
               <a:rPr lang="en-CH" smtClean="0"/>
-              <a:t>11/19/2021</a:t>
+              <a:t>11/20/2021</a:t>
             </a:fld>
             <a:endParaRPr lang="en-CH"/>
           </a:p>
@@ -1113,7 +1113,7 @@
           <a:p>
             <a:fld id="{AFD5325B-1A15-4464-AC58-4D5851FBB6B7}" type="datetimeFigureOut">
               <a:rPr lang="en-CH" smtClean="0"/>
-              <a:t>11/19/2021</a:t>
+              <a:t>11/20/2021</a:t>
             </a:fld>
             <a:endParaRPr lang="en-CH"/>
           </a:p>
@@ -1345,7 +1345,7 @@
           <a:p>
             <a:fld id="{AFD5325B-1A15-4464-AC58-4D5851FBB6B7}" type="datetimeFigureOut">
               <a:rPr lang="en-CH" smtClean="0"/>
-              <a:t>11/19/2021</a:t>
+              <a:t>11/20/2021</a:t>
             </a:fld>
             <a:endParaRPr lang="en-CH"/>
           </a:p>
@@ -1712,7 +1712,7 @@
           <a:p>
             <a:fld id="{AFD5325B-1A15-4464-AC58-4D5851FBB6B7}" type="datetimeFigureOut">
               <a:rPr lang="en-CH" smtClean="0"/>
-              <a:t>11/19/2021</a:t>
+              <a:t>11/20/2021</a:t>
             </a:fld>
             <a:endParaRPr lang="en-CH"/>
           </a:p>
@@ -1830,7 +1830,7 @@
           <a:p>
             <a:fld id="{AFD5325B-1A15-4464-AC58-4D5851FBB6B7}" type="datetimeFigureOut">
               <a:rPr lang="en-CH" smtClean="0"/>
-              <a:t>11/19/2021</a:t>
+              <a:t>11/20/2021</a:t>
             </a:fld>
             <a:endParaRPr lang="en-CH"/>
           </a:p>
@@ -1925,7 +1925,7 @@
           <a:p>
             <a:fld id="{AFD5325B-1A15-4464-AC58-4D5851FBB6B7}" type="datetimeFigureOut">
               <a:rPr lang="en-CH" smtClean="0"/>
-              <a:t>11/19/2021</a:t>
+              <a:t>11/20/2021</a:t>
             </a:fld>
             <a:endParaRPr lang="en-CH"/>
           </a:p>
@@ -2202,7 +2202,7 @@
           <a:p>
             <a:fld id="{AFD5325B-1A15-4464-AC58-4D5851FBB6B7}" type="datetimeFigureOut">
               <a:rPr lang="en-CH" smtClean="0"/>
-              <a:t>11/19/2021</a:t>
+              <a:t>11/20/2021</a:t>
             </a:fld>
             <a:endParaRPr lang="en-CH"/>
           </a:p>
@@ -2459,7 +2459,7 @@
           <a:p>
             <a:fld id="{AFD5325B-1A15-4464-AC58-4D5851FBB6B7}" type="datetimeFigureOut">
               <a:rPr lang="en-CH" smtClean="0"/>
-              <a:t>11/19/2021</a:t>
+              <a:t>11/20/2021</a:t>
             </a:fld>
             <a:endParaRPr lang="en-CH"/>
           </a:p>
@@ -2672,7 +2672,7 @@
           <a:p>
             <a:fld id="{AFD5325B-1A15-4464-AC58-4D5851FBB6B7}" type="datetimeFigureOut">
               <a:rPr lang="en-CH" smtClean="0"/>
-              <a:t>11/19/2021</a:t>
+              <a:t>11/20/2021</a:t>
             </a:fld>
             <a:endParaRPr lang="en-CH"/>
           </a:p>
@@ -3080,10 +3080,10 @@
       </p:grpSpPr>
       <p:sp>
         <p:nvSpPr>
-          <p:cNvPr id="7" name="Rectangle 6">
+          <p:cNvPr id="4" name="Rectangle 3">
             <a:extLst>
               <a:ext uri="{FF2B5EF4-FFF2-40B4-BE49-F238E27FC236}">
-                <a16:creationId xmlns:a16="http://schemas.microsoft.com/office/drawing/2014/main" id="{7DFDE14A-EF36-483A-A932-514011F9AA0C}"/>
+                <a16:creationId xmlns:a16="http://schemas.microsoft.com/office/drawing/2014/main" id="{294E475F-DE3E-4412-9F35-20A563F1BBCF}"/>
               </a:ext>
             </a:extLst>
           </p:cNvPr>
@@ -3092,8 +3092,8 @@
         </p:nvSpPr>
         <p:spPr>
           <a:xfrm>
-            <a:off x="407343" y="335589"/>
-            <a:ext cx="20533108" cy="1569025"/>
+            <a:off x="171450" y="2342868"/>
+            <a:ext cx="21004894" cy="5368572"/>
           </a:xfrm>
           <a:prstGeom prst="rect">
             <a:avLst/>
@@ -3115,167 +3115,164 @@
           </a:fontRef>
         </p:style>
         <p:txBody>
-          <a:bodyPr rtlCol="0" anchor="ctr"/>
-          <a:lstStyle/>
-          <a:p>
-            <a:pPr algn="ctr"/>
-            <a:r>
-              <a:rPr lang="en-US" sz="4752" b="1" dirty="0"/>
-              <a:t>Comparing Decision Tree and K-Nearest Neighbor for Cerebral Stroke Prediction</a:t>
-            </a:r>
-            <a:br>
-              <a:rPr lang="en-US" sz="4276" b="1" dirty="0"/>
-            </a:br>
-            <a:r>
-              <a:rPr lang="en-US" sz="2851" dirty="0"/>
-              <a:t>by Stefan Diener</a:t>
-            </a:r>
-            <a:endParaRPr lang="en-CH" sz="4276" dirty="0"/>
-          </a:p>
-        </p:txBody>
-      </p:sp>
-      <mc:AlternateContent xmlns:mc="http://schemas.openxmlformats.org/markup-compatibility/2006">
-        <mc:Choice xmlns:a14="http://schemas.microsoft.com/office/drawing/2010/main" Requires="a14">
-          <p:sp>
-            <p:nvSpPr>
-              <p:cNvPr id="8" name="Rectangle 7">
-                <a:extLst>
-                  <a:ext uri="{FF2B5EF4-FFF2-40B4-BE49-F238E27FC236}">
-                    <a16:creationId xmlns:a16="http://schemas.microsoft.com/office/drawing/2014/main" id="{93E259DF-0A40-4B37-B115-0319E48BC63A}"/>
-                  </a:ext>
-                </a:extLst>
-              </p:cNvPr>
-              <p:cNvSpPr/>
-              <p:nvPr/>
-            </p:nvSpPr>
-            <p:spPr>
-              <a:xfrm>
-                <a:off x="407342" y="1904614"/>
-                <a:ext cx="20533107" cy="2019686"/>
-              </a:xfrm>
-              <a:prstGeom prst="rect">
-                <a:avLst/>
-              </a:prstGeom>
-              <a:ln w="38100"/>
-            </p:spPr>
-            <p:style>
-              <a:lnRef idx="2">
-                <a:schemeClr val="dk1"/>
-              </a:lnRef>
-              <a:fillRef idx="1">
-                <a:schemeClr val="lt1"/>
-              </a:fillRef>
-              <a:effectRef idx="0">
-                <a:schemeClr val="dk1"/>
-              </a:effectRef>
-              <a:fontRef idx="minor">
-                <a:schemeClr val="dk1"/>
-              </a:fontRef>
-            </p:style>
-            <p:txBody>
-              <a:bodyPr rtlCol="0" anchor="t"/>
-              <a:lstStyle/>
-              <a:p>
-                <a:r>
-                  <a:rPr lang="en-US" sz="2851" b="1" dirty="0"/>
-                  <a:t>1) Description and Motivation of the Problem</a:t>
-                </a:r>
-              </a:p>
-              <a:p>
-                <a:r>
-                  <a:rPr lang="en-US" sz="2400" dirty="0"/>
-                  <a:t>In 2020, England recorded cerebrovascular diseases are the third leading cause of death</a:t>
-                </a:r>
-                <a14:m>
-                  <m:oMath xmlns:m="http://schemas.openxmlformats.org/officeDocument/2006/math">
-                    <m:sSup>
-                      <m:sSupPr>
-                        <m:ctrlPr>
-                          <a:rPr lang="en-US" sz="2400" i="1">
-                            <a:latin typeface="Cambria Math" panose="02040503050406030204" pitchFamily="18" charset="0"/>
-                          </a:rPr>
-                        </m:ctrlPr>
-                      </m:sSupPr>
-                      <m:e>
-                        <m:r>
-                          <a:rPr lang="en-US" sz="2400" i="1">
-                            <a:latin typeface="Cambria Math" panose="02040503050406030204" pitchFamily="18" charset="0"/>
-                          </a:rPr>
-                          <m:t> </m:t>
-                        </m:r>
-                      </m:e>
-                      <m:sup>
-                        <m:r>
-                          <a:rPr lang="en-US" sz="2400">
-                            <a:latin typeface="Cambria Math" panose="02040503050406030204" pitchFamily="18" charset="0"/>
-                          </a:rPr>
-                          <m:t>1</m:t>
-                        </m:r>
-                      </m:sup>
-                    </m:sSup>
-                  </m:oMath>
-                </a14:m>
-                <a:r>
-                  <a:rPr lang="en-US" sz="2400" dirty="0"/>
-                  <a:t>. A cerebral stroke is a subtype of these diseases in which the blood supply to part of the brain is interrupted, depriving brain tissue of oxygen and nutrients and causing the death of brain cells within minutes. Therefore, predicting whether a person will have a cerebral stroke can be of great importance to public health, as it can help ensure adequate preparation and quick action in an emergency. The goal of this project is to train and compare the ability of a Decision Tree and a K-Nearest Neighbor classifier to predict whether a person will suffer a heart stroke.</a:t>
-                </a:r>
-                <a:endParaRPr lang="en-CH" sz="2400" dirty="0"/>
-              </a:p>
-            </p:txBody>
-          </p:sp>
-        </mc:Choice>
-        <mc:Fallback>
-          <p:sp>
-            <p:nvSpPr>
-              <p:cNvPr id="8" name="Rectangle 7">
-                <a:extLst>
-                  <a:ext uri="{FF2B5EF4-FFF2-40B4-BE49-F238E27FC236}">
-                    <a16:creationId xmlns:a16="http://schemas.microsoft.com/office/drawing/2014/main" id="{93E259DF-0A40-4B37-B115-0319E48BC63A}"/>
-                  </a:ext>
-                </a:extLst>
-              </p:cNvPr>
-              <p:cNvSpPr>
-                <a:spLocks noRot="1" noChangeAspect="1" noMove="1" noResize="1" noEditPoints="1" noAdjustHandles="1" noChangeArrowheads="1" noChangeShapeType="1" noTextEdit="1"/>
-              </p:cNvSpPr>
-              <p:nvPr/>
-            </p:nvSpPr>
-            <p:spPr>
-              <a:xfrm>
-                <a:off x="407342" y="1904614"/>
-                <a:ext cx="20533107" cy="2019686"/>
-              </a:xfrm>
-              <a:prstGeom prst="rect">
-                <a:avLst/>
-              </a:prstGeom>
-              <a:blipFill>
-                <a:blip r:embed="rId2"/>
-                <a:stretch>
-                  <a:fillRect l="-533" t="-1775" r="-593" b="-4142"/>
-                </a:stretch>
-              </a:blipFill>
-              <a:ln w="38100"/>
-            </p:spPr>
-            <p:txBody>
-              <a:bodyPr/>
-              <a:lstStyle/>
-              <a:p>
-                <a:r>
-                  <a:rPr lang="en-GB">
-                    <a:noFill/>
-                  </a:rPr>
-                  <a:t> </a:t>
-                </a:r>
-              </a:p>
-            </p:txBody>
-          </p:sp>
-        </mc:Fallback>
-      </mc:AlternateContent>
-      <p:sp>
-        <p:nvSpPr>
-          <p:cNvPr id="4" name="Rectangle 3">
+          <a:bodyPr rtlCol="0" anchor="t"/>
+          <a:lstStyle/>
+          <a:p>
+            <a:r>
+              <a:rPr lang="en-US" sz="2000" b="1" dirty="0"/>
+              <a:t>2) Initial analysis of the data set including basic statistics</a:t>
+            </a:r>
+          </a:p>
+          <a:p>
+            <a:pPr marL="342900" indent="-342900">
+              <a:buFont typeface="Arial" panose="020B0604020202020204" pitchFamily="34" charset="0"/>
+              <a:buChar char="•"/>
+            </a:pPr>
+            <a:r>
+              <a:rPr lang="en-US" sz="1600" dirty="0"/>
+              <a:t>The medical data set on cerebral strokes is supplement to Lui, Fan and Wu (2019) was published on data.mendeley.com. </a:t>
+            </a:r>
+          </a:p>
+          <a:p>
+            <a:pPr marL="342900" indent="-342900">
+              <a:buFont typeface="Arial" panose="020B0604020202020204" pitchFamily="34" charset="0"/>
+              <a:buChar char="•"/>
+            </a:pPr>
+            <a:r>
+              <a:rPr lang="en-US" sz="1600" dirty="0"/>
+              <a:t>It contains 43’000 observations of potential patients, one target variable and 11 features on the patients’ </a:t>
+            </a:r>
+            <a:r>
+              <a:rPr lang="en-GB" sz="1600" b="0" i="0" dirty="0">
+                <a:solidFill>
+                  <a:srgbClr val="2E2E2E"/>
+                </a:solidFill>
+                <a:effectLst/>
+                <a:latin typeface="NexusSerif"/>
+              </a:rPr>
+              <a:t>physiology.</a:t>
+            </a:r>
+          </a:p>
+          <a:p>
+            <a:pPr marL="342900" indent="-342900">
+              <a:buFont typeface="Arial" panose="020B0604020202020204" pitchFamily="34" charset="0"/>
+              <a:buChar char="•"/>
+            </a:pPr>
+            <a:r>
+              <a:rPr lang="en-GB" sz="1600" dirty="0">
+                <a:solidFill>
+                  <a:srgbClr val="2E2E2E"/>
+                </a:solidFill>
+                <a:latin typeface="NexusSerif"/>
+              </a:rPr>
+              <a:t>The data is characterized by imbalance in the target variable, and missing values primarily in the ‘Smoking Status’ feature.</a:t>
+            </a:r>
+          </a:p>
+          <a:p>
+            <a:pPr marL="342900" indent="-342900">
+              <a:buFont typeface="Arial" panose="020B0604020202020204" pitchFamily="34" charset="0"/>
+              <a:buChar char="•"/>
+            </a:pPr>
+            <a:r>
+              <a:rPr lang="en-GB" sz="1600" dirty="0">
+                <a:solidFill>
+                  <a:srgbClr val="2E2E2E"/>
+                </a:solidFill>
+                <a:latin typeface="NexusSerif"/>
+              </a:rPr>
+              <a:t>Missing Values: BMI: 3.3%, </a:t>
+            </a:r>
+            <a:r>
+              <a:rPr lang="en-GB" sz="1600">
+                <a:solidFill>
+                  <a:srgbClr val="2E2E2E"/>
+                </a:solidFill>
+                <a:latin typeface="NexusSerif"/>
+              </a:rPr>
+              <a:t>Smoking Status 30.6%</a:t>
+            </a:r>
+            <a:endParaRPr lang="en-GB" sz="1600" dirty="0">
+              <a:solidFill>
+                <a:srgbClr val="2E2E2E"/>
+              </a:solidFill>
+              <a:latin typeface="NexusSerif"/>
+            </a:endParaRPr>
+          </a:p>
+          <a:p>
+            <a:pPr marL="342900" indent="-342900">
+              <a:buFont typeface="Arial" panose="020B0604020202020204" pitchFamily="34" charset="0"/>
+              <a:buChar char="•"/>
+            </a:pPr>
+            <a:endParaRPr lang="en-GB" sz="1600" dirty="0">
+              <a:solidFill>
+                <a:srgbClr val="2E2E2E"/>
+              </a:solidFill>
+              <a:latin typeface="NexusSerif"/>
+            </a:endParaRPr>
+          </a:p>
+          <a:p>
+            <a:pPr marL="342900" indent="-342900">
+              <a:buFont typeface="Arial" panose="020B0604020202020204" pitchFamily="34" charset="0"/>
+              <a:buChar char="•"/>
+            </a:pPr>
+            <a:r>
+              <a:rPr lang="en-US" sz="1600" dirty="0"/>
+              <a:t>738 cases of stroke. </a:t>
+            </a:r>
+          </a:p>
+          <a:p>
+            <a:pPr marL="342900" indent="-342900">
+              <a:buFont typeface="Arial" panose="020B0604020202020204" pitchFamily="34" charset="0"/>
+              <a:buChar char="•"/>
+            </a:pPr>
+            <a:r>
+              <a:rPr lang="en-US" sz="1600" dirty="0"/>
+              <a:t>In addition to the binary stroke variable, it contains five binary, three continuous, two categorical features</a:t>
+            </a:r>
+          </a:p>
+        </p:txBody>
+      </p:sp>
+      <p:pic>
+        <p:nvPicPr>
+          <p:cNvPr id="22" name="Picture 21" descr="Chart, bar chart&#10;&#10;Description automatically generated">
             <a:extLst>
               <a:ext uri="{FF2B5EF4-FFF2-40B4-BE49-F238E27FC236}">
-                <a16:creationId xmlns:a16="http://schemas.microsoft.com/office/drawing/2014/main" id="{294E475F-DE3E-4412-9F35-20A563F1BBCF}"/>
+                <a16:creationId xmlns:a16="http://schemas.microsoft.com/office/drawing/2014/main" id="{84B4D877-D7AC-4128-86F1-756BCF97D2B0}"/>
+              </a:ext>
+            </a:extLst>
+          </p:cNvPr>
+          <p:cNvPicPr>
+            <a:picLocks noChangeAspect="1"/>
+          </p:cNvPicPr>
+          <p:nvPr/>
+        </p:nvPicPr>
+        <p:blipFill rotWithShape="1">
+          <a:blip r:embed="rId2">
+            <a:extLst>
+              <a:ext uri="{28A0092B-C50C-407E-A947-70E740481C1C}">
+                <a14:useLocalDpi xmlns:a14="http://schemas.microsoft.com/office/drawing/2010/main" val="0"/>
+              </a:ext>
+            </a:extLst>
+          </a:blip>
+          <a:srcRect l="878" r="1619" b="5311"/>
+          <a:stretch/>
+        </p:blipFill>
+        <p:spPr>
+          <a:xfrm>
+            <a:off x="9497229" y="5783735"/>
+            <a:ext cx="5859050" cy="1896499"/>
+          </a:xfrm>
+          <a:prstGeom prst="rect">
+            <a:avLst/>
+          </a:prstGeom>
+        </p:spPr>
+      </p:pic>
+      <p:sp>
+        <p:nvSpPr>
+          <p:cNvPr id="7" name="Rectangle 6">
+            <a:extLst>
+              <a:ext uri="{FF2B5EF4-FFF2-40B4-BE49-F238E27FC236}">
+                <a16:creationId xmlns:a16="http://schemas.microsoft.com/office/drawing/2014/main" id="{7DFDE14A-EF36-483A-A932-514011F9AA0C}"/>
               </a:ext>
             </a:extLst>
           </p:cNvPr>
@@ -3284,8 +3281,8 @@
         </p:nvSpPr>
         <p:spPr>
           <a:xfrm>
-            <a:off x="407342" y="3924300"/>
-            <a:ext cx="20533107" cy="5715000"/>
+            <a:off x="171450" y="133350"/>
+            <a:ext cx="21004894" cy="1001369"/>
           </a:xfrm>
           <a:prstGeom prst="rect">
             <a:avLst/>
@@ -3307,25 +3304,1016 @@
           </a:fontRef>
         </p:style>
         <p:txBody>
+          <a:bodyPr rtlCol="0" anchor="ctr"/>
+          <a:lstStyle/>
+          <a:p>
+            <a:pPr algn="ctr"/>
+            <a:r>
+              <a:rPr lang="en-US" sz="3600" b="1" dirty="0"/>
+              <a:t>Comparing Decision Tree and K-Nearest Neighbor for Cerebral Stroke Prediction</a:t>
+            </a:r>
+            <a:br>
+              <a:rPr lang="en-US" sz="3200" b="1" dirty="0"/>
+            </a:br>
+            <a:r>
+              <a:rPr lang="en-US" sz="2000" dirty="0"/>
+              <a:t>by Stefan Diener</a:t>
+            </a:r>
+            <a:endParaRPr lang="en-CH" sz="3200" dirty="0"/>
+          </a:p>
+        </p:txBody>
+      </p:sp>
+      <p:sp>
+        <p:nvSpPr>
+          <p:cNvPr id="8" name="Rectangle 7">
+            <a:extLst>
+              <a:ext uri="{FF2B5EF4-FFF2-40B4-BE49-F238E27FC236}">
+                <a16:creationId xmlns:a16="http://schemas.microsoft.com/office/drawing/2014/main" id="{93E259DF-0A40-4B37-B115-0319E48BC63A}"/>
+              </a:ext>
+            </a:extLst>
+          </p:cNvPr>
+          <p:cNvSpPr/>
+          <p:nvPr/>
+        </p:nvSpPr>
+        <p:spPr>
+          <a:xfrm>
+            <a:off x="171450" y="1134719"/>
+            <a:ext cx="21004894" cy="1208431"/>
+          </a:xfrm>
+          <a:prstGeom prst="rect">
+            <a:avLst/>
+          </a:prstGeom>
+          <a:ln w="38100"/>
+        </p:spPr>
+        <p:style>
+          <a:lnRef idx="2">
+            <a:schemeClr val="dk1"/>
+          </a:lnRef>
+          <a:fillRef idx="1">
+            <a:schemeClr val="lt1"/>
+          </a:fillRef>
+          <a:effectRef idx="0">
+            <a:schemeClr val="dk1"/>
+          </a:effectRef>
+          <a:fontRef idx="minor">
+            <a:schemeClr val="dk1"/>
+          </a:fontRef>
+        </p:style>
+        <p:txBody>
           <a:bodyPr rtlCol="0" anchor="t"/>
           <a:lstStyle/>
           <a:p>
             <a:r>
-              <a:rPr lang="en-US" sz="2851" b="1" dirty="0"/>
-              <a:t>2) Initial analysis of the data set including basic statistics</a:t>
-            </a:r>
-          </a:p>
-          <a:p>
-            <a:endParaRPr lang="en-US" sz="2851" b="1" dirty="0"/>
-          </a:p>
-          <a:p>
-            <a:endParaRPr lang="en-US" sz="2851" b="1" dirty="0"/>
-          </a:p>
-          <a:p>
-            <a:endParaRPr lang="en-US" sz="2851" b="1" dirty="0"/>
-          </a:p>
-        </p:txBody>
-      </p:sp>
+              <a:rPr lang="en-US" sz="2000" b="1" dirty="0"/>
+              <a:t>1) Description and Motivation of the Problem</a:t>
+            </a:r>
+          </a:p>
+          <a:p>
+            <a:r>
+              <a:rPr lang="en-US" sz="1600" dirty="0"/>
+              <a:t>In 2020, England recorded cerebrovascular diseases are the third leading cause of death [1]. A cerebral stroke is a subtype of these diseases in which the blood supply to part of the brain is interrupted, depriving brain tissue of oxygen and nutrients and causing the death of brain cells within minutes. Therefore, predicting whether a person will have a cerebral stroke can be of great importance to public health, as it can help ensure adequate preparation and quick action in an emergency. The goal of this project is to train and compare the ability of a Decision Tree and a K-Nearest Neighbor classifier  to predict whether a person will suffer a stroke.</a:t>
+            </a:r>
+            <a:endParaRPr lang="en-CH" sz="1600" dirty="0"/>
+          </a:p>
+        </p:txBody>
+      </p:sp>
+      <p:pic>
+        <p:nvPicPr>
+          <p:cNvPr id="16" name="Picture 15" descr="Chart&#10;&#10;Description automatically generated">
+            <a:extLst>
+              <a:ext uri="{FF2B5EF4-FFF2-40B4-BE49-F238E27FC236}">
+                <a16:creationId xmlns:a16="http://schemas.microsoft.com/office/drawing/2014/main" id="{108E50C5-21A4-4CA1-82ED-12802D98FA18}"/>
+              </a:ext>
+            </a:extLst>
+          </p:cNvPr>
+          <p:cNvPicPr>
+            <a:picLocks noChangeAspect="1"/>
+          </p:cNvPicPr>
+          <p:nvPr/>
+        </p:nvPicPr>
+        <p:blipFill rotWithShape="1">
+          <a:blip r:embed="rId3">
+            <a:extLst>
+              <a:ext uri="{28A0092B-C50C-407E-A947-70E740481C1C}">
+                <a14:useLocalDpi xmlns:a14="http://schemas.microsoft.com/office/drawing/2010/main" val="0"/>
+              </a:ext>
+            </a:extLst>
+          </a:blip>
+          <a:srcRect l="2101" t="11135" r="5228" b="7908"/>
+          <a:stretch/>
+        </p:blipFill>
+        <p:spPr>
+          <a:xfrm>
+            <a:off x="15114488" y="2373709"/>
+            <a:ext cx="6038632" cy="5275320"/>
+          </a:xfrm>
+          <a:prstGeom prst="rect">
+            <a:avLst/>
+          </a:prstGeom>
+        </p:spPr>
+      </p:pic>
+      <p:pic>
+        <p:nvPicPr>
+          <p:cNvPr id="26" name="Picture 25" descr="Chart, pie chart&#10;&#10;Description automatically generated">
+            <a:extLst>
+              <a:ext uri="{FF2B5EF4-FFF2-40B4-BE49-F238E27FC236}">
+                <a16:creationId xmlns:a16="http://schemas.microsoft.com/office/drawing/2014/main" id="{CECC96C7-A2D4-48C6-A24A-0AFAC10521D4}"/>
+              </a:ext>
+            </a:extLst>
+          </p:cNvPr>
+          <p:cNvPicPr>
+            <a:picLocks noChangeAspect="1"/>
+          </p:cNvPicPr>
+          <p:nvPr/>
+        </p:nvPicPr>
+        <p:blipFill rotWithShape="1">
+          <a:blip r:embed="rId4">
+            <a:extLst>
+              <a:ext uri="{28A0092B-C50C-407E-A947-70E740481C1C}">
+                <a14:useLocalDpi xmlns:a14="http://schemas.microsoft.com/office/drawing/2010/main" val="0"/>
+              </a:ext>
+            </a:extLst>
+          </a:blip>
+          <a:srcRect l="6430" t="4367" r="6430" b="12617"/>
+          <a:stretch/>
+        </p:blipFill>
+        <p:spPr>
+          <a:xfrm>
+            <a:off x="8680464" y="4002684"/>
+            <a:ext cx="2654308" cy="1896499"/>
+          </a:xfrm>
+          <a:prstGeom prst="rect">
+            <a:avLst/>
+          </a:prstGeom>
+        </p:spPr>
+      </p:pic>
+      <p:graphicFrame>
+        <p:nvGraphicFramePr>
+          <p:cNvPr id="27" name="Table 27">
+            <a:extLst>
+              <a:ext uri="{FF2B5EF4-FFF2-40B4-BE49-F238E27FC236}">
+                <a16:creationId xmlns:a16="http://schemas.microsoft.com/office/drawing/2014/main" id="{EE35C4B2-E62D-4C0F-A41F-358DF773639B}"/>
+              </a:ext>
+            </a:extLst>
+          </p:cNvPr>
+          <p:cNvGraphicFramePr>
+            <a:graphicFrameLocks noGrp="1"/>
+          </p:cNvGraphicFramePr>
+          <p:nvPr>
+            <p:extLst>
+              <p:ext uri="{D42A27DB-BD31-4B8C-83A1-F6EECF244321}">
+                <p14:modId xmlns:p14="http://schemas.microsoft.com/office/powerpoint/2010/main" val="2544480992"/>
+              </p:ext>
+            </p:extLst>
+          </p:nvPr>
+        </p:nvGraphicFramePr>
+        <p:xfrm>
+          <a:off x="11583948" y="2445182"/>
+          <a:ext cx="3281364" cy="2590800"/>
+        </p:xfrm>
+        <a:graphic>
+          <a:graphicData uri="http://schemas.openxmlformats.org/drawingml/2006/table">
+            <a:tbl>
+              <a:tblPr firstRow="1" bandRow="1">
+                <a:tableStyleId>{9D7B26C5-4107-4FEC-AEDC-1716B250A1EF}</a:tableStyleId>
+              </a:tblPr>
+              <a:tblGrid>
+                <a:gridCol w="997268">
+                  <a:extLst>
+                    <a:ext uri="{9D8B030D-6E8A-4147-A177-3AD203B41FA5}">
+                      <a16:colId xmlns:a16="http://schemas.microsoft.com/office/drawing/2014/main" val="3467800109"/>
+                    </a:ext>
+                  </a:extLst>
+                </a:gridCol>
+                <a:gridCol w="535305">
+                  <a:extLst>
+                    <a:ext uri="{9D8B030D-6E8A-4147-A177-3AD203B41FA5}">
+                      <a16:colId xmlns:a16="http://schemas.microsoft.com/office/drawing/2014/main" val="2542221043"/>
+                    </a:ext>
+                  </a:extLst>
+                </a:gridCol>
+                <a:gridCol w="606743">
+                  <a:extLst>
+                    <a:ext uri="{9D8B030D-6E8A-4147-A177-3AD203B41FA5}">
+                      <a16:colId xmlns:a16="http://schemas.microsoft.com/office/drawing/2014/main" val="2395979764"/>
+                    </a:ext>
+                  </a:extLst>
+                </a:gridCol>
+                <a:gridCol w="606743">
+                  <a:extLst>
+                    <a:ext uri="{9D8B030D-6E8A-4147-A177-3AD203B41FA5}">
+                      <a16:colId xmlns:a16="http://schemas.microsoft.com/office/drawing/2014/main" val="1101614973"/>
+                    </a:ext>
+                  </a:extLst>
+                </a:gridCol>
+                <a:gridCol w="535305">
+                  <a:extLst>
+                    <a:ext uri="{9D8B030D-6E8A-4147-A177-3AD203B41FA5}">
+                      <a16:colId xmlns:a16="http://schemas.microsoft.com/office/drawing/2014/main" val="2784924489"/>
+                    </a:ext>
+                  </a:extLst>
+                </a:gridCol>
+              </a:tblGrid>
+              <a:tr h="178772">
+                <a:tc>
+                  <a:txBody>
+                    <a:bodyPr/>
+                    <a:lstStyle/>
+                    <a:p>
+                      <a:r>
+                        <a:rPr lang="en-GB" sz="1100" dirty="0"/>
+                        <a:t>Variable</a:t>
+                      </a:r>
+                    </a:p>
+                  </a:txBody>
+                  <a:tcPr/>
+                </a:tc>
+                <a:tc>
+                  <a:txBody>
+                    <a:bodyPr/>
+                    <a:lstStyle/>
+                    <a:p>
+                      <a:r>
+                        <a:rPr lang="en-GB" sz="1100" dirty="0"/>
+                        <a:t>Min</a:t>
+                      </a:r>
+                    </a:p>
+                  </a:txBody>
+                  <a:tcPr/>
+                </a:tc>
+                <a:tc>
+                  <a:txBody>
+                    <a:bodyPr/>
+                    <a:lstStyle/>
+                    <a:p>
+                      <a:r>
+                        <a:rPr lang="en-GB" sz="1100" dirty="0"/>
+                        <a:t>Mean</a:t>
+                      </a:r>
+                    </a:p>
+                  </a:txBody>
+                  <a:tcPr/>
+                </a:tc>
+                <a:tc>
+                  <a:txBody>
+                    <a:bodyPr/>
+                    <a:lstStyle/>
+                    <a:p>
+                      <a:r>
+                        <a:rPr lang="en-GB" sz="1100" dirty="0"/>
+                        <a:t>Max</a:t>
+                      </a:r>
+                    </a:p>
+                  </a:txBody>
+                  <a:tcPr/>
+                </a:tc>
+                <a:tc>
+                  <a:txBody>
+                    <a:bodyPr/>
+                    <a:lstStyle/>
+                    <a:p>
+                      <a:r>
+                        <a:rPr lang="en-GB" sz="1100" dirty="0"/>
+                        <a:t>SD</a:t>
+                      </a:r>
+                    </a:p>
+                  </a:txBody>
+                  <a:tcPr/>
+                </a:tc>
+                <a:extLst>
+                  <a:ext uri="{0D108BD9-81ED-4DB2-BD59-A6C34878D82A}">
+                    <a16:rowId xmlns:a16="http://schemas.microsoft.com/office/drawing/2014/main" val="1769268115"/>
+                  </a:ext>
+                </a:extLst>
+              </a:tr>
+              <a:tr h="200633">
+                <a:tc>
+                  <a:txBody>
+                    <a:bodyPr/>
+                    <a:lstStyle/>
+                    <a:p>
+                      <a:r>
+                        <a:rPr lang="en-GB" sz="1100" dirty="0"/>
+                        <a:t>Stroke</a:t>
+                      </a:r>
+                    </a:p>
+                  </a:txBody>
+                  <a:tcPr/>
+                </a:tc>
+                <a:tc>
+                  <a:txBody>
+                    <a:bodyPr/>
+                    <a:lstStyle/>
+                    <a:p>
+                      <a:r>
+                        <a:rPr lang="en-GB" sz="1100" dirty="0"/>
+                        <a:t>0</a:t>
+                      </a:r>
+                    </a:p>
+                  </a:txBody>
+                  <a:tcPr/>
+                </a:tc>
+                <a:tc>
+                  <a:txBody>
+                    <a:bodyPr/>
+                    <a:lstStyle/>
+                    <a:p>
+                      <a:r>
+                        <a:rPr lang="en-GB" sz="1100" dirty="0"/>
+                        <a:t>0.02</a:t>
+                      </a:r>
+                    </a:p>
+                  </a:txBody>
+                  <a:tcPr/>
+                </a:tc>
+                <a:tc>
+                  <a:txBody>
+                    <a:bodyPr/>
+                    <a:lstStyle/>
+                    <a:p>
+                      <a:r>
+                        <a:rPr lang="en-GB" sz="1100" dirty="0"/>
+                        <a:t>1</a:t>
+                      </a:r>
+                    </a:p>
+                  </a:txBody>
+                  <a:tcPr/>
+                </a:tc>
+                <a:tc>
+                  <a:txBody>
+                    <a:bodyPr/>
+                    <a:lstStyle/>
+                    <a:p>
+                      <a:r>
+                        <a:rPr lang="en-GB" sz="1100" dirty="0"/>
+                        <a:t>0.12</a:t>
+                      </a:r>
+                    </a:p>
+                  </a:txBody>
+                  <a:tcPr/>
+                </a:tc>
+                <a:extLst>
+                  <a:ext uri="{0D108BD9-81ED-4DB2-BD59-A6C34878D82A}">
+                    <a16:rowId xmlns:a16="http://schemas.microsoft.com/office/drawing/2014/main" val="1205327121"/>
+                  </a:ext>
+                </a:extLst>
+              </a:tr>
+              <a:tr h="200633">
+                <a:tc>
+                  <a:txBody>
+                    <a:bodyPr/>
+                    <a:lstStyle/>
+                    <a:p>
+                      <a:r>
+                        <a:rPr lang="en-GB" sz="1100" dirty="0"/>
+                        <a:t>Gender</a:t>
+                      </a:r>
+                    </a:p>
+                  </a:txBody>
+                  <a:tcPr/>
+                </a:tc>
+                <a:tc>
+                  <a:txBody>
+                    <a:bodyPr/>
+                    <a:lstStyle/>
+                    <a:p>
+                      <a:r>
+                        <a:rPr lang="en-GB" sz="1100" dirty="0"/>
+                        <a:t>0</a:t>
+                      </a:r>
+                    </a:p>
+                  </a:txBody>
+                  <a:tcPr/>
+                </a:tc>
+                <a:tc>
+                  <a:txBody>
+                    <a:bodyPr/>
+                    <a:lstStyle/>
+                    <a:p>
+                      <a:r>
+                        <a:rPr lang="en-GB" sz="1100" dirty="0"/>
+                        <a:t>0.40</a:t>
+                      </a:r>
+                    </a:p>
+                  </a:txBody>
+                  <a:tcPr/>
+                </a:tc>
+                <a:tc>
+                  <a:txBody>
+                    <a:bodyPr/>
+                    <a:lstStyle/>
+                    <a:p>
+                      <a:r>
+                        <a:rPr lang="en-GB" sz="1100" dirty="0"/>
+                        <a:t>1</a:t>
+                      </a:r>
+                    </a:p>
+                  </a:txBody>
+                  <a:tcPr/>
+                </a:tc>
+                <a:tc>
+                  <a:txBody>
+                    <a:bodyPr/>
+                    <a:lstStyle/>
+                    <a:p>
+                      <a:r>
+                        <a:rPr lang="en-GB" sz="1100" dirty="0"/>
+                        <a:t>0.49</a:t>
+                      </a:r>
+                    </a:p>
+                  </a:txBody>
+                  <a:tcPr/>
+                </a:tc>
+                <a:extLst>
+                  <a:ext uri="{0D108BD9-81ED-4DB2-BD59-A6C34878D82A}">
+                    <a16:rowId xmlns:a16="http://schemas.microsoft.com/office/drawing/2014/main" val="333028761"/>
+                  </a:ext>
+                </a:extLst>
+              </a:tr>
+              <a:tr h="200633">
+                <a:tc>
+                  <a:txBody>
+                    <a:bodyPr/>
+                    <a:lstStyle/>
+                    <a:p>
+                      <a:r>
+                        <a:rPr lang="en-GB" sz="1100" dirty="0"/>
+                        <a:t>Hypertension</a:t>
+                      </a:r>
+                    </a:p>
+                  </a:txBody>
+                  <a:tcPr/>
+                </a:tc>
+                <a:tc>
+                  <a:txBody>
+                    <a:bodyPr/>
+                    <a:lstStyle/>
+                    <a:p>
+                      <a:r>
+                        <a:rPr lang="en-GB" sz="1100" dirty="0"/>
+                        <a:t>0</a:t>
+                      </a:r>
+                    </a:p>
+                  </a:txBody>
+                  <a:tcPr/>
+                </a:tc>
+                <a:tc>
+                  <a:txBody>
+                    <a:bodyPr/>
+                    <a:lstStyle/>
+                    <a:p>
+                      <a:r>
+                        <a:rPr lang="en-GB" sz="1100" dirty="0"/>
+                        <a:t>0.09</a:t>
+                      </a:r>
+                    </a:p>
+                  </a:txBody>
+                  <a:tcPr/>
+                </a:tc>
+                <a:tc>
+                  <a:txBody>
+                    <a:bodyPr/>
+                    <a:lstStyle/>
+                    <a:p>
+                      <a:r>
+                        <a:rPr lang="en-GB" sz="1100" dirty="0"/>
+                        <a:t>1</a:t>
+                      </a:r>
+                    </a:p>
+                  </a:txBody>
+                  <a:tcPr/>
+                </a:tc>
+                <a:tc>
+                  <a:txBody>
+                    <a:bodyPr/>
+                    <a:lstStyle/>
+                    <a:p>
+                      <a:r>
+                        <a:rPr lang="en-GB" sz="1100" dirty="0"/>
+                        <a:t>0.28</a:t>
+                      </a:r>
+                    </a:p>
+                  </a:txBody>
+                  <a:tcPr/>
+                </a:tc>
+                <a:extLst>
+                  <a:ext uri="{0D108BD9-81ED-4DB2-BD59-A6C34878D82A}">
+                    <a16:rowId xmlns:a16="http://schemas.microsoft.com/office/drawing/2014/main" val="2712605215"/>
+                  </a:ext>
+                </a:extLst>
+              </a:tr>
+              <a:tr h="200633">
+                <a:tc>
+                  <a:txBody>
+                    <a:bodyPr/>
+                    <a:lstStyle/>
+                    <a:p>
+                      <a:r>
+                        <a:rPr lang="en-GB" sz="1100" dirty="0"/>
+                        <a:t>Heart Disease</a:t>
+                      </a:r>
+                    </a:p>
+                  </a:txBody>
+                  <a:tcPr/>
+                </a:tc>
+                <a:tc>
+                  <a:txBody>
+                    <a:bodyPr/>
+                    <a:lstStyle/>
+                    <a:p>
+                      <a:r>
+                        <a:rPr lang="en-GB" sz="1100" dirty="0"/>
+                        <a:t>0</a:t>
+                      </a:r>
+                    </a:p>
+                  </a:txBody>
+                  <a:tcPr/>
+                </a:tc>
+                <a:tc>
+                  <a:txBody>
+                    <a:bodyPr/>
+                    <a:lstStyle/>
+                    <a:p>
+                      <a:r>
+                        <a:rPr lang="en-GB" sz="1100" dirty="0"/>
+                        <a:t>0.04</a:t>
+                      </a:r>
+                    </a:p>
+                  </a:txBody>
+                  <a:tcPr/>
+                </a:tc>
+                <a:tc>
+                  <a:txBody>
+                    <a:bodyPr/>
+                    <a:lstStyle/>
+                    <a:p>
+                      <a:r>
+                        <a:rPr lang="en-GB" sz="1100" dirty="0"/>
+                        <a:t>1</a:t>
+                      </a:r>
+                    </a:p>
+                  </a:txBody>
+                  <a:tcPr/>
+                </a:tc>
+                <a:tc>
+                  <a:txBody>
+                    <a:bodyPr/>
+                    <a:lstStyle/>
+                    <a:p>
+                      <a:r>
+                        <a:rPr lang="en-GB" sz="1100" dirty="0"/>
+                        <a:t>0.20</a:t>
+                      </a:r>
+                    </a:p>
+                  </a:txBody>
+                  <a:tcPr/>
+                </a:tc>
+                <a:extLst>
+                  <a:ext uri="{0D108BD9-81ED-4DB2-BD59-A6C34878D82A}">
+                    <a16:rowId xmlns:a16="http://schemas.microsoft.com/office/drawing/2014/main" val="2833281321"/>
+                  </a:ext>
+                </a:extLst>
+              </a:tr>
+              <a:tr h="200633">
+                <a:tc>
+                  <a:txBody>
+                    <a:bodyPr/>
+                    <a:lstStyle/>
+                    <a:p>
+                      <a:r>
+                        <a:rPr lang="en-GB" sz="1100" dirty="0"/>
+                        <a:t>Ever Married</a:t>
+                      </a:r>
+                    </a:p>
+                  </a:txBody>
+                  <a:tcPr/>
+                </a:tc>
+                <a:tc>
+                  <a:txBody>
+                    <a:bodyPr/>
+                    <a:lstStyle/>
+                    <a:p>
+                      <a:r>
+                        <a:rPr lang="en-GB" sz="1100" dirty="0"/>
+                        <a:t>0</a:t>
+                      </a:r>
+                    </a:p>
+                  </a:txBody>
+                  <a:tcPr/>
+                </a:tc>
+                <a:tc>
+                  <a:txBody>
+                    <a:bodyPr/>
+                    <a:lstStyle/>
+                    <a:p>
+                      <a:r>
+                        <a:rPr lang="en-GB" sz="1100" dirty="0"/>
+                        <a:t>0.64</a:t>
+                      </a:r>
+                    </a:p>
+                  </a:txBody>
+                  <a:tcPr/>
+                </a:tc>
+                <a:tc>
+                  <a:txBody>
+                    <a:bodyPr/>
+                    <a:lstStyle/>
+                    <a:p>
+                      <a:r>
+                        <a:rPr lang="en-GB" sz="1100" dirty="0"/>
+                        <a:t>1</a:t>
+                      </a:r>
+                    </a:p>
+                  </a:txBody>
+                  <a:tcPr/>
+                </a:tc>
+                <a:tc>
+                  <a:txBody>
+                    <a:bodyPr/>
+                    <a:lstStyle/>
+                    <a:p>
+                      <a:r>
+                        <a:rPr lang="en-GB" sz="1100" dirty="0"/>
+                        <a:t>0.48</a:t>
+                      </a:r>
+                    </a:p>
+                  </a:txBody>
+                  <a:tcPr/>
+                </a:tc>
+                <a:extLst>
+                  <a:ext uri="{0D108BD9-81ED-4DB2-BD59-A6C34878D82A}">
+                    <a16:rowId xmlns:a16="http://schemas.microsoft.com/office/drawing/2014/main" val="1832187765"/>
+                  </a:ext>
+                </a:extLst>
+              </a:tr>
+              <a:tr h="200633">
+                <a:tc>
+                  <a:txBody>
+                    <a:bodyPr/>
+                    <a:lstStyle/>
+                    <a:p>
+                      <a:r>
+                        <a:rPr lang="en-GB" sz="1100" dirty="0"/>
+                        <a:t>Urban Home</a:t>
+                      </a:r>
+                    </a:p>
+                  </a:txBody>
+                  <a:tcPr/>
+                </a:tc>
+                <a:tc>
+                  <a:txBody>
+                    <a:bodyPr/>
+                    <a:lstStyle/>
+                    <a:p>
+                      <a:r>
+                        <a:rPr lang="en-GB" sz="1100" dirty="0"/>
+                        <a:t>0</a:t>
+                      </a:r>
+                    </a:p>
+                  </a:txBody>
+                  <a:tcPr/>
+                </a:tc>
+                <a:tc>
+                  <a:txBody>
+                    <a:bodyPr/>
+                    <a:lstStyle/>
+                    <a:p>
+                      <a:r>
+                        <a:rPr lang="en-GB" sz="1100" dirty="0"/>
+                        <a:t>0.50</a:t>
+                      </a:r>
+                    </a:p>
+                  </a:txBody>
+                  <a:tcPr/>
+                </a:tc>
+                <a:tc>
+                  <a:txBody>
+                    <a:bodyPr/>
+                    <a:lstStyle/>
+                    <a:p>
+                      <a:r>
+                        <a:rPr lang="en-GB" sz="1100" dirty="0"/>
+                        <a:t>1</a:t>
+                      </a:r>
+                    </a:p>
+                  </a:txBody>
+                  <a:tcPr/>
+                </a:tc>
+                <a:tc>
+                  <a:txBody>
+                    <a:bodyPr/>
+                    <a:lstStyle/>
+                    <a:p>
+                      <a:r>
+                        <a:rPr lang="en-GB" sz="1100" dirty="0"/>
+                        <a:t>0.50</a:t>
+                      </a:r>
+                    </a:p>
+                  </a:txBody>
+                  <a:tcPr/>
+                </a:tc>
+                <a:extLst>
+                  <a:ext uri="{0D108BD9-81ED-4DB2-BD59-A6C34878D82A}">
+                    <a16:rowId xmlns:a16="http://schemas.microsoft.com/office/drawing/2014/main" val="3461106054"/>
+                  </a:ext>
+                </a:extLst>
+              </a:tr>
+              <a:tr h="200633">
+                <a:tc>
+                  <a:txBody>
+                    <a:bodyPr/>
+                    <a:lstStyle/>
+                    <a:p>
+                      <a:r>
+                        <a:rPr lang="en-GB" sz="1100" dirty="0"/>
+                        <a:t>Age</a:t>
+                      </a:r>
+                    </a:p>
+                  </a:txBody>
+                  <a:tcPr/>
+                </a:tc>
+                <a:tc>
+                  <a:txBody>
+                    <a:bodyPr/>
+                    <a:lstStyle/>
+                    <a:p>
+                      <a:r>
+                        <a:rPr lang="en-GB" sz="1100" dirty="0"/>
+                        <a:t>0</a:t>
+                      </a:r>
+                    </a:p>
+                  </a:txBody>
+                  <a:tcPr/>
+                </a:tc>
+                <a:tc>
+                  <a:txBody>
+                    <a:bodyPr/>
+                    <a:lstStyle/>
+                    <a:p>
+                      <a:r>
+                        <a:rPr lang="en-GB" sz="1100" dirty="0"/>
+                        <a:t>41</a:t>
+                      </a:r>
+                    </a:p>
+                  </a:txBody>
+                  <a:tcPr/>
+                </a:tc>
+                <a:tc>
+                  <a:txBody>
+                    <a:bodyPr/>
+                    <a:lstStyle/>
+                    <a:p>
+                      <a:r>
+                        <a:rPr lang="en-GB" sz="1100" dirty="0"/>
+                        <a:t>82</a:t>
+                      </a:r>
+                    </a:p>
+                  </a:txBody>
+                  <a:tcPr/>
+                </a:tc>
+                <a:tc>
+                  <a:txBody>
+                    <a:bodyPr/>
+                    <a:lstStyle/>
+                    <a:p>
+                      <a:r>
+                        <a:rPr lang="en-GB" sz="1100" dirty="0"/>
+                        <a:t>22.48</a:t>
+                      </a:r>
+                    </a:p>
+                  </a:txBody>
+                  <a:tcPr/>
+                </a:tc>
+                <a:extLst>
+                  <a:ext uri="{0D108BD9-81ED-4DB2-BD59-A6C34878D82A}">
+                    <a16:rowId xmlns:a16="http://schemas.microsoft.com/office/drawing/2014/main" val="1846404377"/>
+                  </a:ext>
+                </a:extLst>
+              </a:tr>
+              <a:tr h="200633">
+                <a:tc>
+                  <a:txBody>
+                    <a:bodyPr/>
+                    <a:lstStyle/>
+                    <a:p>
+                      <a:r>
+                        <a:rPr lang="en-GB" sz="1100" dirty="0" err="1"/>
+                        <a:t>Avg</a:t>
+                      </a:r>
+                      <a:r>
+                        <a:rPr lang="en-GB" sz="1100" dirty="0"/>
+                        <a:t> Glucose</a:t>
+                      </a:r>
+                    </a:p>
+                  </a:txBody>
+                  <a:tcPr/>
+                </a:tc>
+                <a:tc>
+                  <a:txBody>
+                    <a:bodyPr/>
+                    <a:lstStyle/>
+                    <a:p>
+                      <a:r>
+                        <a:rPr lang="en-GB" sz="1100" dirty="0"/>
+                        <a:t>55.00</a:t>
+                      </a:r>
+                    </a:p>
+                  </a:txBody>
+                  <a:tcPr/>
+                </a:tc>
+                <a:tc>
+                  <a:txBody>
+                    <a:bodyPr/>
+                    <a:lstStyle/>
+                    <a:p>
+                      <a:r>
+                        <a:rPr lang="en-GB" sz="1100" dirty="0"/>
+                        <a:t>103.67</a:t>
+                      </a:r>
+                    </a:p>
+                  </a:txBody>
+                  <a:tcPr/>
+                </a:tc>
+                <a:tc>
+                  <a:txBody>
+                    <a:bodyPr/>
+                    <a:lstStyle/>
+                    <a:p>
+                      <a:r>
+                        <a:rPr lang="en-GB" sz="1100" dirty="0"/>
+                        <a:t>291.05</a:t>
+                      </a:r>
+                    </a:p>
+                  </a:txBody>
+                  <a:tcPr/>
+                </a:tc>
+                <a:tc>
+                  <a:txBody>
+                    <a:bodyPr/>
+                    <a:lstStyle/>
+                    <a:p>
+                      <a:r>
+                        <a:rPr lang="en-GB" sz="1100" dirty="0"/>
+                        <a:t>42.28</a:t>
+                      </a:r>
+                    </a:p>
+                  </a:txBody>
+                  <a:tcPr/>
+                </a:tc>
+                <a:extLst>
+                  <a:ext uri="{0D108BD9-81ED-4DB2-BD59-A6C34878D82A}">
+                    <a16:rowId xmlns:a16="http://schemas.microsoft.com/office/drawing/2014/main" val="2468859034"/>
+                  </a:ext>
+                </a:extLst>
+              </a:tr>
+              <a:tr h="200633">
+                <a:tc>
+                  <a:txBody>
+                    <a:bodyPr/>
+                    <a:lstStyle/>
+                    <a:p>
+                      <a:r>
+                        <a:rPr lang="en-GB" sz="1100" dirty="0"/>
+                        <a:t>BMI</a:t>
+                      </a:r>
+                    </a:p>
+                  </a:txBody>
+                  <a:tcPr/>
+                </a:tc>
+                <a:tc>
+                  <a:txBody>
+                    <a:bodyPr/>
+                    <a:lstStyle/>
+                    <a:p>
+                      <a:r>
+                        <a:rPr lang="en-GB" sz="1100" dirty="0"/>
+                        <a:t>10.10</a:t>
+                      </a:r>
+                    </a:p>
+                  </a:txBody>
+                  <a:tcPr/>
+                </a:tc>
+                <a:tc>
+                  <a:txBody>
+                    <a:bodyPr/>
+                    <a:lstStyle/>
+                    <a:p>
+                      <a:r>
+                        <a:rPr lang="en-GB" sz="1100" dirty="0"/>
+                        <a:t>28.62</a:t>
+                      </a:r>
+                    </a:p>
+                  </a:txBody>
+                  <a:tcPr/>
+                </a:tc>
+                <a:tc>
+                  <a:txBody>
+                    <a:bodyPr/>
+                    <a:lstStyle/>
+                    <a:p>
+                      <a:r>
+                        <a:rPr lang="en-GB" sz="1100" dirty="0"/>
+                        <a:t>97.60</a:t>
+                      </a:r>
+                    </a:p>
+                  </a:txBody>
+                  <a:tcPr/>
+                </a:tc>
+                <a:tc>
+                  <a:txBody>
+                    <a:bodyPr/>
+                    <a:lstStyle/>
+                    <a:p>
+                      <a:r>
+                        <a:rPr lang="en-GB" sz="1100" dirty="0"/>
+                        <a:t>7.77</a:t>
+                      </a:r>
+                    </a:p>
+                  </a:txBody>
+                  <a:tcPr/>
+                </a:tc>
+                <a:extLst>
+                  <a:ext uri="{0D108BD9-81ED-4DB2-BD59-A6C34878D82A}">
+                    <a16:rowId xmlns:a16="http://schemas.microsoft.com/office/drawing/2014/main" val="520551929"/>
+                  </a:ext>
+                </a:extLst>
+              </a:tr>
+            </a:tbl>
+          </a:graphicData>
+        </a:graphic>
+      </p:graphicFrame>
+      <p:pic>
+        <p:nvPicPr>
+          <p:cNvPr id="33" name="Picture 32" descr="Chart, bar chart&#10;&#10;Description automatically generated">
+            <a:extLst>
+              <a:ext uri="{FF2B5EF4-FFF2-40B4-BE49-F238E27FC236}">
+                <a16:creationId xmlns:a16="http://schemas.microsoft.com/office/drawing/2014/main" id="{7AD3EC94-D541-4CB1-8D29-EA9DE3A4C9E7}"/>
+              </a:ext>
+            </a:extLst>
+          </p:cNvPr>
+          <p:cNvPicPr>
+            <a:picLocks noChangeAspect="1"/>
+          </p:cNvPicPr>
+          <p:nvPr/>
+        </p:nvPicPr>
+        <p:blipFill>
+          <a:blip r:embed="rId5">
+            <a:extLst>
+              <a:ext uri="{28A0092B-C50C-407E-A947-70E740481C1C}">
+                <a14:useLocalDpi xmlns:a14="http://schemas.microsoft.com/office/drawing/2010/main" val="0"/>
+              </a:ext>
+            </a:extLst>
+          </a:blip>
+          <a:stretch>
+            <a:fillRect/>
+          </a:stretch>
+        </p:blipFill>
+        <p:spPr>
+          <a:xfrm>
+            <a:off x="6204658" y="5837962"/>
+            <a:ext cx="3622134" cy="1811067"/>
+          </a:xfrm>
+          <a:prstGeom prst="rect">
+            <a:avLst/>
+          </a:prstGeom>
+        </p:spPr>
+      </p:pic>
+      <p:pic>
+        <p:nvPicPr>
+          <p:cNvPr id="37" name="Picture 36" descr="Chart, histogram&#10;&#10;Description automatically generated">
+            <a:extLst>
+              <a:ext uri="{FF2B5EF4-FFF2-40B4-BE49-F238E27FC236}">
+                <a16:creationId xmlns:a16="http://schemas.microsoft.com/office/drawing/2014/main" id="{C8D46654-1AE0-4027-996E-C099BE4ED8EF}"/>
+              </a:ext>
+            </a:extLst>
+          </p:cNvPr>
+          <p:cNvPicPr>
+            <a:picLocks noChangeAspect="1"/>
+          </p:cNvPicPr>
+          <p:nvPr/>
+        </p:nvPicPr>
+        <p:blipFill>
+          <a:blip r:embed="rId6">
+            <a:extLst>
+              <a:ext uri="{28A0092B-C50C-407E-A947-70E740481C1C}">
+                <a14:useLocalDpi xmlns:a14="http://schemas.microsoft.com/office/drawing/2010/main" val="0"/>
+              </a:ext>
+            </a:extLst>
+          </a:blip>
+          <a:stretch>
+            <a:fillRect/>
+          </a:stretch>
+        </p:blipFill>
+        <p:spPr>
+          <a:xfrm>
+            <a:off x="307620" y="5899183"/>
+            <a:ext cx="6170295" cy="2056765"/>
+          </a:xfrm>
+          <a:prstGeom prst="rect">
+            <a:avLst/>
+          </a:prstGeom>
+        </p:spPr>
+      </p:pic>
     </p:spTree>
     <p:extLst>
       <p:ext uri="{BB962C8B-B14F-4D97-AF65-F5344CB8AC3E}">

</xml_diff>